<commit_message>
Add new figures and an updated report.
</commit_message>
<xml_diff>
--- a/Screenshots/Report/system_design_high_level_overview.pptx
+++ b/Screenshots/Report/system_design_high_level_overview.pptx
@@ -104,6 +104,11 @@
       </a:defRPr>
     </a:lvl9pPr>
   </p:defaultTextStyle>
+  <p:extLst>
+    <p:ext uri="{EFAFB233-063F-42B5-8137-9DF3F51BA10A}">
+      <p15:sldGuideLst xmlns:p15="http://schemas.microsoft.com/office/powerpoint/2012/main"/>
+    </p:ext>
+  </p:extLst>
 </p:presentation>
 </file>
 
@@ -413,7 +418,7 @@
           <a:p>
             <a:fld id="{6CA69CD3-39CE-436C-89C3-62BD6241315F}" type="datetimeFigureOut">
               <a:rPr lang="en-GB" smtClean="0"/>
-              <a:t>05/09/2021</a:t>
+              <a:t>06/09/2021</a:t>
             </a:fld>
             <a:endParaRPr lang="en-GB"/>
           </a:p>
@@ -613,7 +618,7 @@
           <a:p>
             <a:fld id="{6CA69CD3-39CE-436C-89C3-62BD6241315F}" type="datetimeFigureOut">
               <a:rPr lang="en-GB" smtClean="0"/>
-              <a:t>05/09/2021</a:t>
+              <a:t>06/09/2021</a:t>
             </a:fld>
             <a:endParaRPr lang="en-GB"/>
           </a:p>
@@ -823,7 +828,7 @@
           <a:p>
             <a:fld id="{6CA69CD3-39CE-436C-89C3-62BD6241315F}" type="datetimeFigureOut">
               <a:rPr lang="en-GB" smtClean="0"/>
-              <a:t>05/09/2021</a:t>
+              <a:t>06/09/2021</a:t>
             </a:fld>
             <a:endParaRPr lang="en-GB"/>
           </a:p>
@@ -1023,7 +1028,7 @@
           <a:p>
             <a:fld id="{6CA69CD3-39CE-436C-89C3-62BD6241315F}" type="datetimeFigureOut">
               <a:rPr lang="en-GB" smtClean="0"/>
-              <a:t>05/09/2021</a:t>
+              <a:t>06/09/2021</a:t>
             </a:fld>
             <a:endParaRPr lang="en-GB"/>
           </a:p>
@@ -1299,7 +1304,7 @@
           <a:p>
             <a:fld id="{6CA69CD3-39CE-436C-89C3-62BD6241315F}" type="datetimeFigureOut">
               <a:rPr lang="en-GB" smtClean="0"/>
-              <a:t>05/09/2021</a:t>
+              <a:t>06/09/2021</a:t>
             </a:fld>
             <a:endParaRPr lang="en-GB"/>
           </a:p>
@@ -1567,7 +1572,7 @@
           <a:p>
             <a:fld id="{6CA69CD3-39CE-436C-89C3-62BD6241315F}" type="datetimeFigureOut">
               <a:rPr lang="en-GB" smtClean="0"/>
-              <a:t>05/09/2021</a:t>
+              <a:t>06/09/2021</a:t>
             </a:fld>
             <a:endParaRPr lang="en-GB"/>
           </a:p>
@@ -1982,7 +1987,7 @@
           <a:p>
             <a:fld id="{6CA69CD3-39CE-436C-89C3-62BD6241315F}" type="datetimeFigureOut">
               <a:rPr lang="en-GB" smtClean="0"/>
-              <a:t>05/09/2021</a:t>
+              <a:t>06/09/2021</a:t>
             </a:fld>
             <a:endParaRPr lang="en-GB"/>
           </a:p>
@@ -2124,7 +2129,7 @@
           <a:p>
             <a:fld id="{6CA69CD3-39CE-436C-89C3-62BD6241315F}" type="datetimeFigureOut">
               <a:rPr lang="en-GB" smtClean="0"/>
-              <a:t>05/09/2021</a:t>
+              <a:t>06/09/2021</a:t>
             </a:fld>
             <a:endParaRPr lang="en-GB"/>
           </a:p>
@@ -2237,7 +2242,7 @@
           <a:p>
             <a:fld id="{6CA69CD3-39CE-436C-89C3-62BD6241315F}" type="datetimeFigureOut">
               <a:rPr lang="en-GB" smtClean="0"/>
-              <a:t>05/09/2021</a:t>
+              <a:t>06/09/2021</a:t>
             </a:fld>
             <a:endParaRPr lang="en-GB"/>
           </a:p>
@@ -2550,7 +2555,7 @@
           <a:p>
             <a:fld id="{6CA69CD3-39CE-436C-89C3-62BD6241315F}" type="datetimeFigureOut">
               <a:rPr lang="en-GB" smtClean="0"/>
-              <a:t>05/09/2021</a:t>
+              <a:t>06/09/2021</a:t>
             </a:fld>
             <a:endParaRPr lang="en-GB"/>
           </a:p>
@@ -2839,7 +2844,7 @@
           <a:p>
             <a:fld id="{6CA69CD3-39CE-436C-89C3-62BD6241315F}" type="datetimeFigureOut">
               <a:rPr lang="en-GB" smtClean="0"/>
-              <a:t>05/09/2021</a:t>
+              <a:t>06/09/2021</a:t>
             </a:fld>
             <a:endParaRPr lang="en-GB"/>
           </a:p>
@@ -3082,7 +3087,7 @@
           <a:p>
             <a:fld id="{6CA69CD3-39CE-436C-89C3-62BD6241315F}" type="datetimeFigureOut">
               <a:rPr lang="en-GB" smtClean="0"/>
-              <a:t>05/09/2021</a:t>
+              <a:t>06/09/2021</a:t>
             </a:fld>
             <a:endParaRPr lang="en-GB"/>
           </a:p>
@@ -4007,13 +4012,13 @@
         </p:spPr>
         <p:style>
           <a:lnRef idx="1">
-            <a:schemeClr val="accent2"/>
+            <a:schemeClr val="accent4"/>
           </a:lnRef>
           <a:fillRef idx="2">
-            <a:schemeClr val="accent2"/>
+            <a:schemeClr val="accent4"/>
           </a:fillRef>
           <a:effectRef idx="1">
-            <a:schemeClr val="accent2"/>
+            <a:schemeClr val="accent4"/>
           </a:effectRef>
           <a:fontRef idx="minor">
             <a:schemeClr val="dk1"/>
@@ -4632,7 +4637,7 @@
         </p:nvSpPr>
         <p:spPr>
           <a:xfrm>
-            <a:off x="8595223" y="3084478"/>
+            <a:off x="8595223" y="3023951"/>
             <a:ext cx="1662058" cy="830997"/>
           </a:xfrm>
           <a:prstGeom prst="rect">
@@ -4675,7 +4680,7 @@
         </p:nvSpPr>
         <p:spPr>
           <a:xfrm>
-            <a:off x="6144958" y="2780405"/>
+            <a:off x="6128364" y="2891187"/>
             <a:ext cx="1741523" cy="830997"/>
           </a:xfrm>
           <a:prstGeom prst="rect">
@@ -4759,7 +4764,7 @@
         </p:nvSpPr>
         <p:spPr>
           <a:xfrm>
-            <a:off x="5951280" y="304490"/>
+            <a:off x="5951280" y="363654"/>
             <a:ext cx="1809756" cy="830997"/>
           </a:xfrm>
           <a:prstGeom prst="rect">
@@ -4858,8 +4863,8 @@
         </p:nvSpPr>
         <p:spPr>
           <a:xfrm>
-            <a:off x="6280188" y="1186707"/>
-            <a:ext cx="938077" cy="461665"/>
+            <a:off x="5836067" y="1261705"/>
+            <a:ext cx="2086084" cy="461665"/>
           </a:xfrm>
           <a:prstGeom prst="rect">
             <a:avLst/>
@@ -4874,8 +4879,224 @@
           <a:p>
             <a:r>
               <a:rPr lang="en-GB" sz="2400" dirty="0"/>
-              <a:t>Husky</a:t>
-            </a:r>
+              <a:t>Husky Platform</a:t>
+            </a:r>
+          </a:p>
+        </p:txBody>
+      </p:sp>
+      <p:sp>
+        <p:nvSpPr>
+          <p:cNvPr id="30" name="Arrow: Down 29">
+            <a:extLst>
+              <a:ext uri="{FF2B5EF4-FFF2-40B4-BE49-F238E27FC236}">
+                <a16:creationId xmlns:a16="http://schemas.microsoft.com/office/drawing/2014/main" id="{F8EF6D24-2D1C-44F4-B777-9768BBD0355E}"/>
+              </a:ext>
+            </a:extLst>
+          </p:cNvPr>
+          <p:cNvSpPr/>
+          <p:nvPr/>
+        </p:nvSpPr>
+        <p:spPr>
+          <a:xfrm rot="16200000">
+            <a:off x="9908249" y="4591973"/>
+            <a:ext cx="216000" cy="683619"/>
+          </a:xfrm>
+          <a:prstGeom prst="downArrow">
+            <a:avLst/>
+          </a:prstGeom>
+        </p:spPr>
+        <p:style>
+          <a:lnRef idx="2">
+            <a:schemeClr val="accent3">
+              <a:shade val="50000"/>
+            </a:schemeClr>
+          </a:lnRef>
+          <a:fillRef idx="1">
+            <a:schemeClr val="accent3"/>
+          </a:fillRef>
+          <a:effectRef idx="0">
+            <a:schemeClr val="accent3"/>
+          </a:effectRef>
+          <a:fontRef idx="minor">
+            <a:schemeClr val="lt1"/>
+          </a:fontRef>
+        </p:style>
+        <p:txBody>
+          <a:bodyPr rtlCol="0" anchor="ctr"/>
+          <a:lstStyle/>
+          <a:p>
+            <a:pPr algn="ctr"/>
+            <a:endParaRPr lang="en-GB"/>
+          </a:p>
+        </p:txBody>
+      </p:sp>
+      <p:sp>
+        <p:nvSpPr>
+          <p:cNvPr id="31" name="Arrow: Down 30">
+            <a:extLst>
+              <a:ext uri="{FF2B5EF4-FFF2-40B4-BE49-F238E27FC236}">
+                <a16:creationId xmlns:a16="http://schemas.microsoft.com/office/drawing/2014/main" id="{77CC7973-BA7A-49BB-B4EB-3789C0EF18A6}"/>
+              </a:ext>
+            </a:extLst>
+          </p:cNvPr>
+          <p:cNvSpPr/>
+          <p:nvPr/>
+        </p:nvSpPr>
+        <p:spPr>
+          <a:xfrm rot="16200000">
+            <a:off x="9916294" y="5276349"/>
+            <a:ext cx="216000" cy="699710"/>
+          </a:xfrm>
+          <a:prstGeom prst="downArrow">
+            <a:avLst/>
+          </a:prstGeom>
+        </p:spPr>
+        <p:style>
+          <a:lnRef idx="1">
+            <a:schemeClr val="accent4"/>
+          </a:lnRef>
+          <a:fillRef idx="2">
+            <a:schemeClr val="accent4"/>
+          </a:fillRef>
+          <a:effectRef idx="1">
+            <a:schemeClr val="accent4"/>
+          </a:effectRef>
+          <a:fontRef idx="minor">
+            <a:schemeClr val="dk1"/>
+          </a:fontRef>
+        </p:style>
+        <p:txBody>
+          <a:bodyPr rtlCol="0" anchor="ctr"/>
+          <a:lstStyle/>
+          <a:p>
+            <a:pPr algn="ctr"/>
+            <a:endParaRPr lang="en-GB"/>
+          </a:p>
+        </p:txBody>
+      </p:sp>
+      <p:sp>
+        <p:nvSpPr>
+          <p:cNvPr id="2" name="TextBox 1">
+            <a:extLst>
+              <a:ext uri="{FF2B5EF4-FFF2-40B4-BE49-F238E27FC236}">
+                <a16:creationId xmlns:a16="http://schemas.microsoft.com/office/drawing/2014/main" id="{01BA4113-97F8-4132-80D5-638AD43307FB}"/>
+              </a:ext>
+            </a:extLst>
+          </p:cNvPr>
+          <p:cNvSpPr txBox="1"/>
+          <p:nvPr/>
+        </p:nvSpPr>
+        <p:spPr>
+          <a:xfrm>
+            <a:off x="10358059" y="4633662"/>
+            <a:ext cx="1694351" cy="646331"/>
+          </a:xfrm>
+          <a:prstGeom prst="rect">
+            <a:avLst/>
+          </a:prstGeom>
+          <a:noFill/>
+        </p:spPr>
+        <p:txBody>
+          <a:bodyPr wrap="square" rtlCol="0">
+            <a:spAutoFit/>
+          </a:bodyPr>
+          <a:lstStyle/>
+          <a:p>
+            <a:r>
+              <a:rPr lang="en-GB" dirty="0" err="1"/>
+              <a:t>Rosbridge</a:t>
+            </a:r>
+            <a:r>
+              <a:rPr lang="en-GB" dirty="0"/>
+              <a:t> communication</a:t>
+            </a:r>
+          </a:p>
+        </p:txBody>
+      </p:sp>
+      <p:sp>
+        <p:nvSpPr>
+          <p:cNvPr id="33" name="TextBox 32">
+            <a:extLst>
+              <a:ext uri="{FF2B5EF4-FFF2-40B4-BE49-F238E27FC236}">
+                <a16:creationId xmlns:a16="http://schemas.microsoft.com/office/drawing/2014/main" id="{854A9E30-8CD9-4569-8950-B41495D4ABB5}"/>
+              </a:ext>
+            </a:extLst>
+          </p:cNvPr>
+          <p:cNvSpPr txBox="1"/>
+          <p:nvPr/>
+        </p:nvSpPr>
+        <p:spPr>
+          <a:xfrm>
+            <a:off x="10374149" y="5303038"/>
+            <a:ext cx="1694351" cy="646331"/>
+          </a:xfrm>
+          <a:prstGeom prst="rect">
+            <a:avLst/>
+          </a:prstGeom>
+          <a:noFill/>
+        </p:spPr>
+        <p:txBody>
+          <a:bodyPr wrap="square" rtlCol="0">
+            <a:spAutoFit/>
+          </a:bodyPr>
+          <a:lstStyle/>
+          <a:p>
+            <a:r>
+              <a:rPr lang="en-GB" dirty="0"/>
+              <a:t>ROS communication</a:t>
+            </a:r>
+          </a:p>
+        </p:txBody>
+      </p:sp>
+      <p:sp>
+        <p:nvSpPr>
+          <p:cNvPr id="3" name="Rectangle: Rounded Corners 2">
+            <a:extLst>
+              <a:ext uri="{FF2B5EF4-FFF2-40B4-BE49-F238E27FC236}">
+                <a16:creationId xmlns:a16="http://schemas.microsoft.com/office/drawing/2014/main" id="{2C15557F-8EB5-4399-BDC9-13E4935F7431}"/>
+              </a:ext>
+            </a:extLst>
+          </p:cNvPr>
+          <p:cNvSpPr/>
+          <p:nvPr/>
+        </p:nvSpPr>
+        <p:spPr>
+          <a:xfrm>
+            <a:off x="9581681" y="4633662"/>
+            <a:ext cx="2465496" cy="1315707"/>
+          </a:xfrm>
+          <a:prstGeom prst="roundRect">
+            <a:avLst/>
+          </a:prstGeom>
+          <a:noFill/>
+          <a:ln w="25400">
+            <a:solidFill>
+              <a:schemeClr val="tx1"/>
+            </a:solidFill>
+          </a:ln>
+        </p:spPr>
+        <p:style>
+          <a:lnRef idx="2">
+            <a:schemeClr val="accent1">
+              <a:shade val="50000"/>
+            </a:schemeClr>
+          </a:lnRef>
+          <a:fillRef idx="1">
+            <a:schemeClr val="accent1"/>
+          </a:fillRef>
+          <a:effectRef idx="0">
+            <a:schemeClr val="accent1"/>
+          </a:effectRef>
+          <a:fontRef idx="minor">
+            <a:schemeClr val="lt1"/>
+          </a:fontRef>
+        </p:style>
+        <p:txBody>
+          <a:bodyPr rtlCol="0" anchor="ctr"/>
+          <a:lstStyle/>
+          <a:p>
+            <a:pPr algn="ctr"/>
+            <a:endParaRPr lang="en-GB"/>
           </a:p>
         </p:txBody>
       </p:sp>

</xml_diff>